<commit_message>
add pseudoCode MS word file
</commit_message>
<xml_diff>
--- a/your-project/images/present.pptx
+++ b/your-project/images/present.pptx
@@ -104,6 +104,11 @@
       </a:defRPr>
     </a:lvl9pPr>
   </p:defaultTextStyle>
+  <p:extLst>
+    <p:ext uri="{EFAFB233-063F-42B5-8137-9DF3F51BA10A}">
+      <p15:sldGuideLst xmlns:p15="http://schemas.microsoft.com/office/powerpoint/2012/main"/>
+    </p:ext>
+  </p:extLst>
 </p:presentation>
 </file>
 
@@ -238,7 +243,7 @@
           <a:p>
             <a:fld id="{0719813B-1BFD-4924-BFCA-D275A019F06C}" type="datetimeFigureOut">
               <a:rPr lang="en-US" smtClean="0"/>
-              <a:t>4/3/2020</a:t>
+              <a:t>4/5/2020</a:t>
             </a:fld>
             <a:endParaRPr lang="en-US"/>
           </a:p>
@@ -408,7 +413,7 @@
           <a:p>
             <a:fld id="{0719813B-1BFD-4924-BFCA-D275A019F06C}" type="datetimeFigureOut">
               <a:rPr lang="en-US" smtClean="0"/>
-              <a:t>4/3/2020</a:t>
+              <a:t>4/5/2020</a:t>
             </a:fld>
             <a:endParaRPr lang="en-US"/>
           </a:p>
@@ -588,7 +593,7 @@
           <a:p>
             <a:fld id="{0719813B-1BFD-4924-BFCA-D275A019F06C}" type="datetimeFigureOut">
               <a:rPr lang="en-US" smtClean="0"/>
-              <a:t>4/3/2020</a:t>
+              <a:t>4/5/2020</a:t>
             </a:fld>
             <a:endParaRPr lang="en-US"/>
           </a:p>
@@ -758,7 +763,7 @@
           <a:p>
             <a:fld id="{0719813B-1BFD-4924-BFCA-D275A019F06C}" type="datetimeFigureOut">
               <a:rPr lang="en-US" smtClean="0"/>
-              <a:t>4/3/2020</a:t>
+              <a:t>4/5/2020</a:t>
             </a:fld>
             <a:endParaRPr lang="en-US"/>
           </a:p>
@@ -1004,7 +1009,7 @@
           <a:p>
             <a:fld id="{0719813B-1BFD-4924-BFCA-D275A019F06C}" type="datetimeFigureOut">
               <a:rPr lang="en-US" smtClean="0"/>
-              <a:t>4/3/2020</a:t>
+              <a:t>4/5/2020</a:t>
             </a:fld>
             <a:endParaRPr lang="en-US"/>
           </a:p>
@@ -1236,7 +1241,7 @@
           <a:p>
             <a:fld id="{0719813B-1BFD-4924-BFCA-D275A019F06C}" type="datetimeFigureOut">
               <a:rPr lang="en-US" smtClean="0"/>
-              <a:t>4/3/2020</a:t>
+              <a:t>4/5/2020</a:t>
             </a:fld>
             <a:endParaRPr lang="en-US"/>
           </a:p>
@@ -1603,7 +1608,7 @@
           <a:p>
             <a:fld id="{0719813B-1BFD-4924-BFCA-D275A019F06C}" type="datetimeFigureOut">
               <a:rPr lang="en-US" smtClean="0"/>
-              <a:t>4/3/2020</a:t>
+              <a:t>4/5/2020</a:t>
             </a:fld>
             <a:endParaRPr lang="en-US"/>
           </a:p>
@@ -1721,7 +1726,7 @@
           <a:p>
             <a:fld id="{0719813B-1BFD-4924-BFCA-D275A019F06C}" type="datetimeFigureOut">
               <a:rPr lang="en-US" smtClean="0"/>
-              <a:t>4/3/2020</a:t>
+              <a:t>4/5/2020</a:t>
             </a:fld>
             <a:endParaRPr lang="en-US"/>
           </a:p>
@@ -1816,7 +1821,7 @@
           <a:p>
             <a:fld id="{0719813B-1BFD-4924-BFCA-D275A019F06C}" type="datetimeFigureOut">
               <a:rPr lang="en-US" smtClean="0"/>
-              <a:t>4/3/2020</a:t>
+              <a:t>4/5/2020</a:t>
             </a:fld>
             <a:endParaRPr lang="en-US"/>
           </a:p>
@@ -2093,7 +2098,7 @@
           <a:p>
             <a:fld id="{0719813B-1BFD-4924-BFCA-D275A019F06C}" type="datetimeFigureOut">
               <a:rPr lang="en-US" smtClean="0"/>
-              <a:t>4/3/2020</a:t>
+              <a:t>4/5/2020</a:t>
             </a:fld>
             <a:endParaRPr lang="en-US"/>
           </a:p>
@@ -2346,7 +2351,7 @@
           <a:p>
             <a:fld id="{0719813B-1BFD-4924-BFCA-D275A019F06C}" type="datetimeFigureOut">
               <a:rPr lang="en-US" smtClean="0"/>
-              <a:t>4/3/2020</a:t>
+              <a:t>4/5/2020</a:t>
             </a:fld>
             <a:endParaRPr lang="en-US"/>
           </a:p>
@@ -2559,7 +2564,7 @@
           <a:p>
             <a:fld id="{0719813B-1BFD-4924-BFCA-D275A019F06C}" type="datetimeFigureOut">
               <a:rPr lang="en-US" smtClean="0"/>
-              <a:t>4/3/2020</a:t>
+              <a:t>4/5/2020</a:t>
             </a:fld>
             <a:endParaRPr lang="en-US"/>
           </a:p>
@@ -2967,13 +2972,15 @@
       <p:grpSp>
         <p:nvGrpSpPr>
           <p:cNvPr id="21" name="Group 20"/>
-          <p:cNvGrpSpPr/>
+          <p:cNvGrpSpPr>
+            <a:grpSpLocks noChangeAspect="1"/>
+          </p:cNvGrpSpPr>
           <p:nvPr/>
         </p:nvGrpSpPr>
         <p:grpSpPr>
           <a:xfrm>
-            <a:off x="1145072" y="560786"/>
-            <a:ext cx="1728232" cy="1626622"/>
+            <a:off x="8672029" y="2639395"/>
+            <a:ext cx="2194893" cy="2065846"/>
             <a:chOff x="4154972" y="897336"/>
             <a:chExt cx="1728232" cy="1626622"/>
           </a:xfrm>
@@ -3158,12 +3165,12 @@
             </p:cNvPicPr>
             <p:nvPr>
               <p:custDataLst>
-                <p:tags r:id="rId10"/>
+                <p:tags r:id="rId19"/>
               </p:custDataLst>
             </p:nvPr>
           </p:nvPicPr>
           <p:blipFill>
-            <a:blip r:embed="rId14" cstate="print">
+            <a:blip r:embed="rId23" cstate="print">
               <a:extLst>
                 <a:ext uri="{28A0092B-C50C-407E-A947-70E740481C1C}">
                   <a14:useLocalDpi xmlns:a14="http://schemas.microsoft.com/office/drawing/2010/main" val="0"/>
@@ -3192,12 +3199,12 @@
             </p:cNvPicPr>
             <p:nvPr>
               <p:custDataLst>
-                <p:tags r:id="rId11"/>
+                <p:tags r:id="rId20"/>
               </p:custDataLst>
             </p:nvPr>
           </p:nvPicPr>
           <p:blipFill>
-            <a:blip r:embed="rId15" cstate="print">
+            <a:blip r:embed="rId24" cstate="print">
               <a:extLst>
                 <a:ext uri="{28A0092B-C50C-407E-A947-70E740481C1C}">
                   <a14:useLocalDpi xmlns:a14="http://schemas.microsoft.com/office/drawing/2010/main" val="0"/>
@@ -3226,12 +3233,12 @@
             </p:cNvPicPr>
             <p:nvPr>
               <p:custDataLst>
-                <p:tags r:id="rId12"/>
+                <p:tags r:id="rId21"/>
               </p:custDataLst>
             </p:nvPr>
           </p:nvPicPr>
           <p:blipFill>
-            <a:blip r:embed="rId16" cstate="print">
+            <a:blip r:embed="rId25" cstate="print">
               <a:extLst>
                 <a:ext uri="{28A0092B-C50C-407E-A947-70E740481C1C}">
                   <a14:useLocalDpi xmlns:a14="http://schemas.microsoft.com/office/drawing/2010/main" val="0"/>
@@ -3374,53 +3381,18 @@
           </p:txBody>
         </p:sp>
       </p:grpSp>
-      <p:cxnSp>
-        <p:nvCxnSpPr>
-          <p:cNvPr id="25" name="Straight Connector 24"/>
-          <p:cNvCxnSpPr/>
-          <p:nvPr/>
-        </p:nvCxnSpPr>
-        <p:spPr>
-          <a:xfrm>
-            <a:off x="3244850" y="846592"/>
-            <a:ext cx="0" cy="1371600"/>
-          </a:xfrm>
-          <a:prstGeom prst="line">
-            <a:avLst/>
-          </a:prstGeom>
-          <a:ln w="28575">
-            <a:solidFill>
-              <a:schemeClr val="accent1">
-                <a:lumMod val="50000"/>
-              </a:schemeClr>
-            </a:solidFill>
-          </a:ln>
-        </p:spPr>
-        <p:style>
-          <a:lnRef idx="1">
-            <a:schemeClr val="accent1"/>
-          </a:lnRef>
-          <a:fillRef idx="0">
-            <a:schemeClr val="accent1"/>
-          </a:fillRef>
-          <a:effectRef idx="0">
-            <a:schemeClr val="accent1"/>
-          </a:effectRef>
-          <a:fontRef idx="minor">
-            <a:schemeClr val="tx1"/>
-          </a:fontRef>
-        </p:style>
-      </p:cxnSp>
       <p:grpSp>
         <p:nvGrpSpPr>
           <p:cNvPr id="52" name="Group 51"/>
-          <p:cNvGrpSpPr/>
+          <p:cNvGrpSpPr>
+            <a:grpSpLocks noChangeAspect="1"/>
+          </p:cNvGrpSpPr>
           <p:nvPr/>
         </p:nvGrpSpPr>
         <p:grpSpPr>
           <a:xfrm>
-            <a:off x="4435438" y="962660"/>
-            <a:ext cx="1998588" cy="1828800"/>
+            <a:off x="4766348" y="2551700"/>
+            <a:ext cx="2718976" cy="2487988"/>
             <a:chOff x="4435438" y="962660"/>
             <a:chExt cx="1998588" cy="1828800"/>
           </a:xfrm>
@@ -3611,12 +3583,12 @@
             </p:cNvPicPr>
             <p:nvPr>
               <p:custDataLst>
-                <p:tags r:id="rId1"/>
+                <p:tags r:id="rId10"/>
               </p:custDataLst>
             </p:nvPr>
           </p:nvPicPr>
           <p:blipFill>
-            <a:blip r:embed="rId17" cstate="print">
+            <a:blip r:embed="rId26" cstate="print">
               <a:extLst>
                 <a:ext uri="{28A0092B-C50C-407E-A947-70E740481C1C}">
                   <a14:useLocalDpi xmlns:a14="http://schemas.microsoft.com/office/drawing/2010/main" val="0"/>
@@ -3645,12 +3617,12 @@
             </p:cNvPicPr>
             <p:nvPr>
               <p:custDataLst>
-                <p:tags r:id="rId2"/>
+                <p:tags r:id="rId11"/>
               </p:custDataLst>
             </p:nvPr>
           </p:nvPicPr>
           <p:blipFill>
-            <a:blip r:embed="rId18" cstate="print">
+            <a:blip r:embed="rId27" cstate="print">
               <a:extLst>
                 <a:ext uri="{28A0092B-C50C-407E-A947-70E740481C1C}">
                   <a14:useLocalDpi xmlns:a14="http://schemas.microsoft.com/office/drawing/2010/main" val="0"/>
@@ -3679,12 +3651,12 @@
             </p:cNvPicPr>
             <p:nvPr>
               <p:custDataLst>
-                <p:tags r:id="rId3"/>
+                <p:tags r:id="rId12"/>
               </p:custDataLst>
             </p:nvPr>
           </p:nvPicPr>
           <p:blipFill>
-            <a:blip r:embed="rId19" cstate="print">
+            <a:blip r:embed="rId28" cstate="print">
               <a:extLst>
                 <a:ext uri="{28A0092B-C50C-407E-A947-70E740481C1C}">
                   <a14:useLocalDpi xmlns:a14="http://schemas.microsoft.com/office/drawing/2010/main" val="0"/>
@@ -3713,12 +3685,12 @@
             </p:cNvPicPr>
             <p:nvPr>
               <p:custDataLst>
-                <p:tags r:id="rId4"/>
+                <p:tags r:id="rId13"/>
               </p:custDataLst>
             </p:nvPr>
           </p:nvPicPr>
           <p:blipFill>
-            <a:blip r:embed="rId20" cstate="print">
+            <a:blip r:embed="rId29" cstate="print">
               <a:extLst>
                 <a:ext uri="{28A0092B-C50C-407E-A947-70E740481C1C}">
                   <a14:useLocalDpi xmlns:a14="http://schemas.microsoft.com/office/drawing/2010/main" val="0"/>
@@ -3747,12 +3719,12 @@
             </p:cNvPicPr>
             <p:nvPr>
               <p:custDataLst>
-                <p:tags r:id="rId5"/>
+                <p:tags r:id="rId14"/>
               </p:custDataLst>
             </p:nvPr>
           </p:nvPicPr>
           <p:blipFill>
-            <a:blip r:embed="rId21" cstate="print">
+            <a:blip r:embed="rId30" cstate="print">
               <a:extLst>
                 <a:ext uri="{28A0092B-C50C-407E-A947-70E740481C1C}">
                   <a14:useLocalDpi xmlns:a14="http://schemas.microsoft.com/office/drawing/2010/main" val="0"/>
@@ -3781,12 +3753,12 @@
             </p:cNvPicPr>
             <p:nvPr>
               <p:custDataLst>
-                <p:tags r:id="rId6"/>
+                <p:tags r:id="rId15"/>
               </p:custDataLst>
             </p:nvPr>
           </p:nvPicPr>
           <p:blipFill>
-            <a:blip r:embed="rId22" cstate="print">
+            <a:blip r:embed="rId31" cstate="print">
               <a:extLst>
                 <a:ext uri="{28A0092B-C50C-407E-A947-70E740481C1C}">
                   <a14:useLocalDpi xmlns:a14="http://schemas.microsoft.com/office/drawing/2010/main" val="0"/>
@@ -3815,12 +3787,12 @@
             </p:cNvPicPr>
             <p:nvPr>
               <p:custDataLst>
-                <p:tags r:id="rId7"/>
+                <p:tags r:id="rId16"/>
               </p:custDataLst>
             </p:nvPr>
           </p:nvPicPr>
           <p:blipFill>
-            <a:blip r:embed="rId23" cstate="print">
+            <a:blip r:embed="rId32" cstate="print">
               <a:extLst>
                 <a:ext uri="{28A0092B-C50C-407E-A947-70E740481C1C}">
                   <a14:useLocalDpi xmlns:a14="http://schemas.microsoft.com/office/drawing/2010/main" val="0"/>
@@ -3849,12 +3821,12 @@
             </p:cNvPicPr>
             <p:nvPr>
               <p:custDataLst>
-                <p:tags r:id="rId8"/>
+                <p:tags r:id="rId17"/>
               </p:custDataLst>
             </p:nvPr>
           </p:nvPicPr>
           <p:blipFill>
-            <a:blip r:embed="rId24" cstate="print">
+            <a:blip r:embed="rId33" cstate="print">
               <a:extLst>
                 <a:ext uri="{28A0092B-C50C-407E-A947-70E740481C1C}">
                   <a14:useLocalDpi xmlns:a14="http://schemas.microsoft.com/office/drawing/2010/main" val="0"/>
@@ -3883,12 +3855,12 @@
             </p:cNvPicPr>
             <p:nvPr>
               <p:custDataLst>
-                <p:tags r:id="rId9"/>
+                <p:tags r:id="rId18"/>
               </p:custDataLst>
             </p:nvPr>
           </p:nvPicPr>
           <p:blipFill>
-            <a:blip r:embed="rId25" cstate="print">
+            <a:blip r:embed="rId34" cstate="print">
               <a:extLst>
                 <a:ext uri="{28A0092B-C50C-407E-A947-70E740481C1C}">
                   <a14:useLocalDpi xmlns:a14="http://schemas.microsoft.com/office/drawing/2010/main" val="0"/>
@@ -3910,6 +3882,683 @@
           </p:spPr>
         </p:pic>
       </p:grpSp>
+      <p:sp>
+        <p:nvSpPr>
+          <p:cNvPr id="33" name="TextBox 1 1"/>
+          <p:cNvSpPr txBox="1">
+            <a:spLocks noChangeArrowheads="1"/>
+          </p:cNvSpPr>
+          <p:nvPr/>
+        </p:nvSpPr>
+        <p:spPr bwMode="auto">
+          <a:xfrm>
+            <a:off x="624252" y="753230"/>
+            <a:ext cx="10452189" cy="646331"/>
+          </a:xfrm>
+          <a:prstGeom prst="rect">
+            <a:avLst/>
+          </a:prstGeom>
+          <a:noFill/>
+          <a:ln>
+            <a:noFill/>
+          </a:ln>
+          <a:extLst>
+            <a:ext uri="{909E8E84-426E-40DD-AFC4-6F175D3DCCD1}">
+              <a14:hiddenFill xmlns:a14="http://schemas.microsoft.com/office/drawing/2010/main">
+                <a:solidFill>
+                  <a:srgbClr val="FFFFFF"/>
+                </a:solidFill>
+              </a14:hiddenFill>
+            </a:ext>
+            <a:ext uri="{91240B29-F687-4F45-9708-019B960494DF}">
+              <a14:hiddenLine xmlns:a14="http://schemas.microsoft.com/office/drawing/2010/main" w="9525">
+                <a:solidFill>
+                  <a:srgbClr val="000000"/>
+                </a:solidFill>
+                <a:miter lim="800000"/>
+                <a:headEnd/>
+                <a:tailEnd/>
+              </a14:hiddenLine>
+            </a:ext>
+          </a:extLst>
+        </p:spPr>
+        <p:txBody>
+          <a:bodyPr wrap="square">
+            <a:spAutoFit/>
+          </a:bodyPr>
+          <a:lstStyle>
+            <a:lvl1pPr>
+              <a:defRPr>
+                <a:solidFill>
+                  <a:schemeClr val="tx1"/>
+                </a:solidFill>
+                <a:latin typeface="Arial" panose="020B0604020202020204" pitchFamily="34" charset="0"/>
+                <a:ea typeface="MS PGothic" panose="020B0600070205080204" pitchFamily="34" charset="-128"/>
+              </a:defRPr>
+            </a:lvl1pPr>
+            <a:lvl2pPr marL="742950" indent="-285750">
+              <a:defRPr>
+                <a:solidFill>
+                  <a:schemeClr val="tx1"/>
+                </a:solidFill>
+                <a:latin typeface="Arial" panose="020B0604020202020204" pitchFamily="34" charset="0"/>
+                <a:ea typeface="MS PGothic" panose="020B0600070205080204" pitchFamily="34" charset="-128"/>
+              </a:defRPr>
+            </a:lvl2pPr>
+            <a:lvl3pPr marL="1143000" indent="-228600">
+              <a:defRPr>
+                <a:solidFill>
+                  <a:schemeClr val="tx1"/>
+                </a:solidFill>
+                <a:latin typeface="Arial" panose="020B0604020202020204" pitchFamily="34" charset="0"/>
+                <a:ea typeface="MS PGothic" panose="020B0600070205080204" pitchFamily="34" charset="-128"/>
+              </a:defRPr>
+            </a:lvl3pPr>
+            <a:lvl4pPr marL="1600200" indent="-228600">
+              <a:defRPr>
+                <a:solidFill>
+                  <a:schemeClr val="tx1"/>
+                </a:solidFill>
+                <a:latin typeface="Arial" panose="020B0604020202020204" pitchFamily="34" charset="0"/>
+                <a:ea typeface="MS PGothic" panose="020B0600070205080204" pitchFamily="34" charset="-128"/>
+              </a:defRPr>
+            </a:lvl4pPr>
+            <a:lvl5pPr marL="2057400" indent="-228600">
+              <a:defRPr>
+                <a:solidFill>
+                  <a:schemeClr val="tx1"/>
+                </a:solidFill>
+                <a:latin typeface="Arial" panose="020B0604020202020204" pitchFamily="34" charset="0"/>
+                <a:ea typeface="MS PGothic" panose="020B0600070205080204" pitchFamily="34" charset="-128"/>
+              </a:defRPr>
+            </a:lvl5pPr>
+            <a:lvl6pPr marL="2514600" indent="-228600" eaLnBrk="0" fontAlgn="base" hangingPunct="0">
+              <a:spcBef>
+                <a:spcPct val="0"/>
+              </a:spcBef>
+              <a:spcAft>
+                <a:spcPct val="0"/>
+              </a:spcAft>
+              <a:defRPr>
+                <a:solidFill>
+                  <a:schemeClr val="tx1"/>
+                </a:solidFill>
+                <a:latin typeface="Arial" panose="020B0604020202020204" pitchFamily="34" charset="0"/>
+                <a:ea typeface="MS PGothic" panose="020B0600070205080204" pitchFamily="34" charset="-128"/>
+              </a:defRPr>
+            </a:lvl6pPr>
+            <a:lvl7pPr marL="2971800" indent="-228600" eaLnBrk="0" fontAlgn="base" hangingPunct="0">
+              <a:spcBef>
+                <a:spcPct val="0"/>
+              </a:spcBef>
+              <a:spcAft>
+                <a:spcPct val="0"/>
+              </a:spcAft>
+              <a:defRPr>
+                <a:solidFill>
+                  <a:schemeClr val="tx1"/>
+                </a:solidFill>
+                <a:latin typeface="Arial" panose="020B0604020202020204" pitchFamily="34" charset="0"/>
+                <a:ea typeface="MS PGothic" panose="020B0600070205080204" pitchFamily="34" charset="-128"/>
+              </a:defRPr>
+            </a:lvl7pPr>
+            <a:lvl8pPr marL="3429000" indent="-228600" eaLnBrk="0" fontAlgn="base" hangingPunct="0">
+              <a:spcBef>
+                <a:spcPct val="0"/>
+              </a:spcBef>
+              <a:spcAft>
+                <a:spcPct val="0"/>
+              </a:spcAft>
+              <a:defRPr>
+                <a:solidFill>
+                  <a:schemeClr val="tx1"/>
+                </a:solidFill>
+                <a:latin typeface="Arial" panose="020B0604020202020204" pitchFamily="34" charset="0"/>
+                <a:ea typeface="MS PGothic" panose="020B0600070205080204" pitchFamily="34" charset="-128"/>
+              </a:defRPr>
+            </a:lvl8pPr>
+            <a:lvl9pPr marL="3886200" indent="-228600" eaLnBrk="0" fontAlgn="base" hangingPunct="0">
+              <a:spcBef>
+                <a:spcPct val="0"/>
+              </a:spcBef>
+              <a:spcAft>
+                <a:spcPct val="0"/>
+              </a:spcAft>
+              <a:defRPr>
+                <a:solidFill>
+                  <a:schemeClr val="tx1"/>
+                </a:solidFill>
+                <a:latin typeface="Arial" panose="020B0604020202020204" pitchFamily="34" charset="0"/>
+                <a:ea typeface="MS PGothic" panose="020B0600070205080204" pitchFamily="34" charset="-128"/>
+              </a:defRPr>
+            </a:lvl9pPr>
+          </a:lstStyle>
+          <a:p>
+            <a:pPr algn="ctr"/>
+            <a:r>
+              <a:rPr lang="en-US" sz="3600" dirty="0" err="1" smtClean="0">
+                <a:solidFill>
+                  <a:srgbClr val="FF0000"/>
+                </a:solidFill>
+              </a:rPr>
+              <a:t>Beto’s</a:t>
+            </a:r>
+            <a:r>
+              <a:rPr lang="en-US" sz="3600" dirty="0" smtClean="0">
+                <a:solidFill>
+                  <a:srgbClr val="FF0000"/>
+                </a:solidFill>
+              </a:rPr>
+              <a:t> Tic </a:t>
+            </a:r>
+            <a:r>
+              <a:rPr lang="en-US" sz="3600" dirty="0" err="1" smtClean="0">
+                <a:solidFill>
+                  <a:srgbClr val="FF0000"/>
+                </a:solidFill>
+              </a:rPr>
+              <a:t>Tac</a:t>
+            </a:r>
+            <a:r>
+              <a:rPr lang="en-US" sz="3600" dirty="0" smtClean="0">
+                <a:solidFill>
+                  <a:srgbClr val="FF0000"/>
+                </a:solidFill>
+              </a:rPr>
+              <a:t> Toe in a nutshell !</a:t>
+            </a:r>
+            <a:endParaRPr lang="it-IT" sz="3600" dirty="0">
+              <a:solidFill>
+                <a:srgbClr val="FF0000"/>
+              </a:solidFill>
+            </a:endParaRPr>
+          </a:p>
+        </p:txBody>
+      </p:sp>
+      <p:grpSp>
+        <p:nvGrpSpPr>
+          <p:cNvPr id="36" name="Group 35"/>
+          <p:cNvGrpSpPr/>
+          <p:nvPr/>
+        </p:nvGrpSpPr>
+        <p:grpSpPr>
+          <a:xfrm>
+            <a:off x="2085429" y="2570314"/>
+            <a:ext cx="1036662" cy="2487988"/>
+            <a:chOff x="5048250" y="962660"/>
+            <a:chExt cx="762000" cy="1828800"/>
+          </a:xfrm>
+        </p:grpSpPr>
+        <p:cxnSp>
+          <p:nvCxnSpPr>
+            <p:cNvPr id="58" name="Straight Connector 57"/>
+            <p:cNvCxnSpPr/>
+            <p:nvPr/>
+          </p:nvCxnSpPr>
+          <p:spPr>
+            <a:xfrm>
+              <a:off x="5048250" y="962660"/>
+              <a:ext cx="0" cy="1828800"/>
+            </a:xfrm>
+            <a:prstGeom prst="line">
+              <a:avLst/>
+            </a:prstGeom>
+            <a:ln w="28575">
+              <a:solidFill>
+                <a:schemeClr val="accent1">
+                  <a:lumMod val="50000"/>
+                </a:schemeClr>
+              </a:solidFill>
+            </a:ln>
+          </p:spPr>
+          <p:style>
+            <a:lnRef idx="1">
+              <a:schemeClr val="accent1"/>
+            </a:lnRef>
+            <a:fillRef idx="0">
+              <a:schemeClr val="accent1"/>
+            </a:fillRef>
+            <a:effectRef idx="0">
+              <a:schemeClr val="accent1"/>
+            </a:effectRef>
+            <a:fontRef idx="minor">
+              <a:schemeClr val="tx1"/>
+            </a:fontRef>
+          </p:style>
+        </p:cxnSp>
+        <p:cxnSp>
+          <p:nvCxnSpPr>
+            <p:cNvPr id="59" name="Straight Connector 58"/>
+            <p:cNvCxnSpPr/>
+            <p:nvPr/>
+          </p:nvCxnSpPr>
+          <p:spPr>
+            <a:xfrm>
+              <a:off x="5810250" y="962660"/>
+              <a:ext cx="0" cy="1828800"/>
+            </a:xfrm>
+            <a:prstGeom prst="line">
+              <a:avLst/>
+            </a:prstGeom>
+            <a:ln w="28575">
+              <a:solidFill>
+                <a:schemeClr val="accent1">
+                  <a:lumMod val="50000"/>
+                </a:schemeClr>
+              </a:solidFill>
+            </a:ln>
+          </p:spPr>
+          <p:style>
+            <a:lnRef idx="1">
+              <a:schemeClr val="accent1"/>
+            </a:lnRef>
+            <a:fillRef idx="0">
+              <a:schemeClr val="accent1"/>
+            </a:fillRef>
+            <a:effectRef idx="0">
+              <a:schemeClr val="accent1"/>
+            </a:effectRef>
+            <a:fontRef idx="minor">
+              <a:schemeClr val="tx1"/>
+            </a:fontRef>
+          </p:style>
+        </p:cxnSp>
+      </p:grpSp>
+      <p:grpSp>
+        <p:nvGrpSpPr>
+          <p:cNvPr id="38" name="Group 37"/>
+          <p:cNvGrpSpPr/>
+          <p:nvPr/>
+        </p:nvGrpSpPr>
+        <p:grpSpPr>
+          <a:xfrm rot="16200000">
+            <a:off x="2070516" y="2613592"/>
+            <a:ext cx="1036662" cy="2487988"/>
+            <a:chOff x="5048250" y="962660"/>
+            <a:chExt cx="762000" cy="1828800"/>
+          </a:xfrm>
+        </p:grpSpPr>
+        <p:cxnSp>
+          <p:nvCxnSpPr>
+            <p:cNvPr id="56" name="Straight Connector 55"/>
+            <p:cNvCxnSpPr/>
+            <p:nvPr/>
+          </p:nvCxnSpPr>
+          <p:spPr>
+            <a:xfrm>
+              <a:off x="5048250" y="962660"/>
+              <a:ext cx="0" cy="1828800"/>
+            </a:xfrm>
+            <a:prstGeom prst="line">
+              <a:avLst/>
+            </a:prstGeom>
+            <a:ln w="28575">
+              <a:solidFill>
+                <a:schemeClr val="accent1">
+                  <a:lumMod val="50000"/>
+                </a:schemeClr>
+              </a:solidFill>
+            </a:ln>
+          </p:spPr>
+          <p:style>
+            <a:lnRef idx="1">
+              <a:schemeClr val="accent1"/>
+            </a:lnRef>
+            <a:fillRef idx="0">
+              <a:schemeClr val="accent1"/>
+            </a:fillRef>
+            <a:effectRef idx="0">
+              <a:schemeClr val="accent1"/>
+            </a:effectRef>
+            <a:fontRef idx="minor">
+              <a:schemeClr val="tx1"/>
+            </a:fontRef>
+          </p:style>
+        </p:cxnSp>
+        <p:cxnSp>
+          <p:nvCxnSpPr>
+            <p:cNvPr id="57" name="Straight Connector 56"/>
+            <p:cNvCxnSpPr/>
+            <p:nvPr/>
+          </p:nvCxnSpPr>
+          <p:spPr>
+            <a:xfrm>
+              <a:off x="5810250" y="962660"/>
+              <a:ext cx="0" cy="1828800"/>
+            </a:xfrm>
+            <a:prstGeom prst="line">
+              <a:avLst/>
+            </a:prstGeom>
+            <a:ln w="28575">
+              <a:solidFill>
+                <a:schemeClr val="accent1">
+                  <a:lumMod val="50000"/>
+                </a:schemeClr>
+              </a:solidFill>
+            </a:ln>
+          </p:spPr>
+          <p:style>
+            <a:lnRef idx="1">
+              <a:schemeClr val="accent1"/>
+            </a:lnRef>
+            <a:fillRef idx="0">
+              <a:schemeClr val="accent1"/>
+            </a:fillRef>
+            <a:effectRef idx="0">
+              <a:schemeClr val="accent1"/>
+            </a:effectRef>
+            <a:fontRef idx="minor">
+              <a:schemeClr val="tx1"/>
+            </a:fontRef>
+          </p:style>
+        </p:cxnSp>
+      </p:grpSp>
+      <p:pic>
+        <p:nvPicPr>
+          <p:cNvPr id="13" name="Picture 12"/>
+          <p:cNvPicPr>
+            <a:picLocks noChangeAspect="1"/>
+          </p:cNvPicPr>
+          <p:nvPr>
+            <p:custDataLst>
+              <p:tags r:id="rId1"/>
+            </p:custDataLst>
+          </p:nvPr>
+        </p:nvPicPr>
+        <p:blipFill>
+          <a:blip r:embed="rId35" cstate="print">
+            <a:extLst>
+              <a:ext uri="{28A0092B-C50C-407E-A947-70E740481C1C}">
+                <a14:useLocalDpi xmlns:a14="http://schemas.microsoft.com/office/drawing/2010/main" val="0"/>
+              </a:ext>
+            </a:extLst>
+          </a:blip>
+          <a:stretch>
+            <a:fillRect/>
+          </a:stretch>
+        </p:blipFill>
+        <p:spPr>
+          <a:xfrm>
+            <a:off x="1434682" y="2760091"/>
+            <a:ext cx="234708" cy="175269"/>
+          </a:xfrm>
+          <a:prstGeom prst="rect">
+            <a:avLst/>
+          </a:prstGeom>
+        </p:spPr>
+      </p:pic>
+      <p:pic>
+        <p:nvPicPr>
+          <p:cNvPr id="11" name="Picture 10"/>
+          <p:cNvPicPr>
+            <a:picLocks noChangeAspect="1"/>
+          </p:cNvPicPr>
+          <p:nvPr>
+            <p:custDataLst>
+              <p:tags r:id="rId2"/>
+            </p:custDataLst>
+          </p:nvPr>
+        </p:nvPicPr>
+        <p:blipFill>
+          <a:blip r:embed="rId36" cstate="print">
+            <a:extLst>
+              <a:ext uri="{28A0092B-C50C-407E-A947-70E740481C1C}">
+                <a14:useLocalDpi xmlns:a14="http://schemas.microsoft.com/office/drawing/2010/main" val="0"/>
+              </a:ext>
+            </a:extLst>
+          </a:blip>
+          <a:stretch>
+            <a:fillRect/>
+          </a:stretch>
+        </p:blipFill>
+        <p:spPr>
+          <a:xfrm>
+            <a:off x="2466447" y="2777791"/>
+            <a:ext cx="80776" cy="158504"/>
+          </a:xfrm>
+          <a:prstGeom prst="rect">
+            <a:avLst/>
+          </a:prstGeom>
+        </p:spPr>
+      </p:pic>
+      <p:pic>
+        <p:nvPicPr>
+          <p:cNvPr id="16" name="Picture 15"/>
+          <p:cNvPicPr>
+            <a:picLocks noChangeAspect="1"/>
+          </p:cNvPicPr>
+          <p:nvPr>
+            <p:custDataLst>
+              <p:tags r:id="rId3"/>
+            </p:custDataLst>
+          </p:nvPr>
+        </p:nvPicPr>
+        <p:blipFill>
+          <a:blip r:embed="rId37" cstate="print">
+            <a:extLst>
+              <a:ext uri="{28A0092B-C50C-407E-A947-70E740481C1C}">
+                <a14:useLocalDpi xmlns:a14="http://schemas.microsoft.com/office/drawing/2010/main" val="0"/>
+              </a:ext>
+            </a:extLst>
+          </a:blip>
+          <a:stretch>
+            <a:fillRect/>
+          </a:stretch>
+        </p:blipFill>
+        <p:spPr>
+          <a:xfrm>
+            <a:off x="3409999" y="2777791"/>
+            <a:ext cx="256045" cy="178317"/>
+          </a:xfrm>
+          <a:prstGeom prst="rect">
+            <a:avLst/>
+          </a:prstGeom>
+        </p:spPr>
+      </p:pic>
+      <p:pic>
+        <p:nvPicPr>
+          <p:cNvPr id="19" name="Picture 18"/>
+          <p:cNvPicPr>
+            <a:picLocks noChangeAspect="1"/>
+          </p:cNvPicPr>
+          <p:nvPr>
+            <p:custDataLst>
+              <p:tags r:id="rId4"/>
+            </p:custDataLst>
+          </p:nvPr>
+        </p:nvPicPr>
+        <p:blipFill>
+          <a:blip r:embed="rId38" cstate="print">
+            <a:extLst>
+              <a:ext uri="{28A0092B-C50C-407E-A947-70E740481C1C}">
+                <a14:useLocalDpi xmlns:a14="http://schemas.microsoft.com/office/drawing/2010/main" val="0"/>
+              </a:ext>
+            </a:extLst>
+          </a:blip>
+          <a:stretch>
+            <a:fillRect/>
+          </a:stretch>
+        </p:blipFill>
+        <p:spPr>
+          <a:xfrm>
+            <a:off x="3364219" y="3756790"/>
+            <a:ext cx="384068" cy="178317"/>
+          </a:xfrm>
+          <a:prstGeom prst="rect">
+            <a:avLst/>
+          </a:prstGeom>
+        </p:spPr>
+      </p:pic>
+      <p:pic>
+        <p:nvPicPr>
+          <p:cNvPr id="27" name="Picture 26"/>
+          <p:cNvPicPr>
+            <a:picLocks noChangeAspect="1"/>
+          </p:cNvPicPr>
+          <p:nvPr>
+            <p:custDataLst>
+              <p:tags r:id="rId5"/>
+            </p:custDataLst>
+          </p:nvPr>
+        </p:nvPicPr>
+        <p:blipFill>
+          <a:blip r:embed="rId39" cstate="print">
+            <a:extLst>
+              <a:ext uri="{28A0092B-C50C-407E-A947-70E740481C1C}">
+                <a14:useLocalDpi xmlns:a14="http://schemas.microsoft.com/office/drawing/2010/main" val="0"/>
+              </a:ext>
+            </a:extLst>
+          </a:blip>
+          <a:stretch>
+            <a:fillRect/>
+          </a:stretch>
+        </p:blipFill>
+        <p:spPr>
+          <a:xfrm>
+            <a:off x="3382565" y="4705240"/>
+            <a:ext cx="310912" cy="181365"/>
+          </a:xfrm>
+          <a:prstGeom prst="rect">
+            <a:avLst/>
+          </a:prstGeom>
+        </p:spPr>
+      </p:pic>
+      <p:pic>
+        <p:nvPicPr>
+          <p:cNvPr id="17" name="Picture 16"/>
+          <p:cNvPicPr>
+            <a:picLocks noChangeAspect="1"/>
+          </p:cNvPicPr>
+          <p:nvPr>
+            <p:custDataLst>
+              <p:tags r:id="rId6"/>
+            </p:custDataLst>
+          </p:nvPr>
+        </p:nvPicPr>
+        <p:blipFill>
+          <a:blip r:embed="rId40" cstate="print">
+            <a:extLst>
+              <a:ext uri="{28A0092B-C50C-407E-A947-70E740481C1C}">
+                <a14:useLocalDpi xmlns:a14="http://schemas.microsoft.com/office/drawing/2010/main" val="0"/>
+              </a:ext>
+            </a:extLst>
+          </a:blip>
+          <a:stretch>
+            <a:fillRect/>
+          </a:stretch>
+        </p:blipFill>
+        <p:spPr>
+          <a:xfrm>
+            <a:off x="2425513" y="3795694"/>
+            <a:ext cx="198130" cy="111258"/>
+          </a:xfrm>
+          <a:prstGeom prst="rect">
+            <a:avLst/>
+          </a:prstGeom>
+        </p:spPr>
+      </p:pic>
+      <p:pic>
+        <p:nvPicPr>
+          <p:cNvPr id="26" name="Picture 25"/>
+          <p:cNvPicPr>
+            <a:picLocks noChangeAspect="1"/>
+          </p:cNvPicPr>
+          <p:nvPr>
+            <p:custDataLst>
+              <p:tags r:id="rId7"/>
+            </p:custDataLst>
+          </p:nvPr>
+        </p:nvPicPr>
+        <p:blipFill>
+          <a:blip r:embed="rId41" cstate="print">
+            <a:extLst>
+              <a:ext uri="{28A0092B-C50C-407E-A947-70E740481C1C}">
+                <a14:useLocalDpi xmlns:a14="http://schemas.microsoft.com/office/drawing/2010/main" val="0"/>
+              </a:ext>
+            </a:extLst>
+          </a:blip>
+          <a:stretch>
+            <a:fillRect/>
+          </a:stretch>
+        </p:blipFill>
+        <p:spPr>
+          <a:xfrm>
+            <a:off x="2483212" y="4705240"/>
+            <a:ext cx="128022" cy="178317"/>
+          </a:xfrm>
+          <a:prstGeom prst="rect">
+            <a:avLst/>
+          </a:prstGeom>
+        </p:spPr>
+      </p:pic>
+      <p:pic>
+        <p:nvPicPr>
+          <p:cNvPr id="22" name="Picture 21"/>
+          <p:cNvPicPr>
+            <a:picLocks noChangeAspect="1"/>
+          </p:cNvPicPr>
+          <p:nvPr>
+            <p:custDataLst>
+              <p:tags r:id="rId8"/>
+            </p:custDataLst>
+          </p:nvPr>
+        </p:nvPicPr>
+        <p:blipFill>
+          <a:blip r:embed="rId42" cstate="print">
+            <a:extLst>
+              <a:ext uri="{28A0092B-C50C-407E-A947-70E740481C1C}">
+                <a14:useLocalDpi xmlns:a14="http://schemas.microsoft.com/office/drawing/2010/main" val="0"/>
+              </a:ext>
+            </a:extLst>
+          </a:blip>
+          <a:stretch>
+            <a:fillRect/>
+          </a:stretch>
+        </p:blipFill>
+        <p:spPr>
+          <a:xfrm>
+            <a:off x="1380437" y="3748149"/>
+            <a:ext cx="356634" cy="172221"/>
+          </a:xfrm>
+          <a:prstGeom prst="rect">
+            <a:avLst/>
+          </a:prstGeom>
+        </p:spPr>
+      </p:pic>
+      <p:pic>
+        <p:nvPicPr>
+          <p:cNvPr id="28" name="Picture 27"/>
+          <p:cNvPicPr>
+            <a:picLocks noChangeAspect="1"/>
+          </p:cNvPicPr>
+          <p:nvPr>
+            <p:custDataLst>
+              <p:tags r:id="rId9"/>
+            </p:custDataLst>
+          </p:nvPr>
+        </p:nvPicPr>
+        <p:blipFill>
+          <a:blip r:embed="rId43" cstate="print">
+            <a:extLst>
+              <a:ext uri="{28A0092B-C50C-407E-A947-70E740481C1C}">
+                <a14:useLocalDpi xmlns:a14="http://schemas.microsoft.com/office/drawing/2010/main" val="0"/>
+              </a:ext>
+            </a:extLst>
+          </a:blip>
+          <a:stretch>
+            <a:fillRect/>
+          </a:stretch>
+        </p:blipFill>
+        <p:spPr>
+          <a:xfrm>
+            <a:off x="1380437" y="4705240"/>
+            <a:ext cx="281954" cy="178317"/>
+          </a:xfrm>
+          <a:prstGeom prst="rect">
+            <a:avLst/>
+          </a:prstGeom>
+        </p:spPr>
+      </p:pic>
     </p:spTree>
     <p:extLst>
       <p:ext uri="{BB962C8B-B14F-4D97-AF65-F5344CB8AC3E}">
@@ -3932,6 +4581,22 @@
 
 <file path=ppt/tags/tag1.xml><?xml version="1.0" encoding="utf-8"?>
 <p:tagLst xmlns:a="http://schemas.openxmlformats.org/drawingml/2006/main" xmlns:r="http://schemas.openxmlformats.org/officeDocument/2006/relationships" xmlns:p="http://schemas.openxmlformats.org/presentationml/2006/main">
+  <p:tag name="ORIGINALHEIGHT" val="57.50299"/>
+  <p:tag name="ORIGINALWIDTH" val="77.00394"/>
+  <p:tag name="OUTPUTDPI" val="1200"/>
+  <p:tag name="LATEXADDIN" val="\documentclass{article}&#10;\usepackage{amsmath}&#10;\pagestyle{empty}&#10;\begin{document}&#10;&#10;Lt&#10;&#10;&#10;\end{document}"/>
+  <p:tag name="IGUANATEXSIZE" val="20"/>
+  <p:tag name="IGUANATEXCURSOR" val="81"/>
+  <p:tag name="TRANSPARENCY" val="True"/>
+  <p:tag name="FILENAME" val=""/>
+  <p:tag name="INPUTTYPE" val="0"/>
+  <p:tag name="LATEXENGINEID" val="1"/>
+  <p:tag name="TEMPFOLDER" val="C:\Users\beto\Documents\iguanaTemp\"/>
+</p:tagLst>
+</file>
+
+<file path=ppt/tags/tag10.xml><?xml version="1.0" encoding="utf-8"?>
+<p:tagLst xmlns:a="http://schemas.openxmlformats.org/drawingml/2006/main" xmlns:r="http://schemas.openxmlformats.org/officeDocument/2006/relationships" xmlns:p="http://schemas.openxmlformats.org/presentationml/2006/main">
   <p:tag name="ORIGINALHEIGHT" val="83.00425"/>
   <p:tag name="ORIGINALWIDTH" val="169.0087"/>
   <p:tag name="OUTPUTDPI" val="1200"/>
@@ -3946,7 +4611,135 @@
 </p:tagLst>
 </file>
 
-<file path=ppt/tags/tag10.xml><?xml version="1.0" encoding="utf-8"?>
+<file path=ppt/tags/tag11.xml><?xml version="1.0" encoding="utf-8"?>
+<p:tagLst xmlns:a="http://schemas.openxmlformats.org/drawingml/2006/main" xmlns:r="http://schemas.openxmlformats.org/officeDocument/2006/relationships" xmlns:p="http://schemas.openxmlformats.org/presentationml/2006/main">
+  <p:tag name="ORIGINALHEIGHT" val="83.00425"/>
+  <p:tag name="ORIGINALWIDTH" val="169.0087"/>
+  <p:tag name="OUTPUTDPI" val="1200"/>
+  <p:tag name="LATEXADDIN" val="\documentclass{article}&#10;\usepackage{amsmath}&#10;\pagestyle{empty}&#10;\begin{document}&#10;&#10;$(0,1)$&#10;&#10;&#10;\end{document}"/>
+  <p:tag name="IGUANATEXSIZE" val="18"/>
+  <p:tag name="IGUANATEXCURSOR" val="86"/>
+  <p:tag name="TRANSPARENCY" val="True"/>
+  <p:tag name="FILENAME" val=""/>
+  <p:tag name="INPUTTYPE" val="0"/>
+  <p:tag name="LATEXENGINEID" val="1"/>
+  <p:tag name="TEMPFOLDER" val="C:\Users\beto\Documents\iguanaTemp\"/>
+</p:tagLst>
+</file>
+
+<file path=ppt/tags/tag12.xml><?xml version="1.0" encoding="utf-8"?>
+<p:tagLst xmlns:a="http://schemas.openxmlformats.org/drawingml/2006/main" xmlns:r="http://schemas.openxmlformats.org/officeDocument/2006/relationships" xmlns:p="http://schemas.openxmlformats.org/presentationml/2006/main">
+  <p:tag name="ORIGINALHEIGHT" val="83.00425"/>
+  <p:tag name="ORIGINALWIDTH" val="169.0087"/>
+  <p:tag name="OUTPUTDPI" val="1200"/>
+  <p:tag name="LATEXADDIN" val="\documentclass{article}&#10;\usepackage{amsmath}&#10;\pagestyle{empty}&#10;\begin{document}&#10;&#10;$(0,2)$&#10;&#10;&#10;\end{document}"/>
+  <p:tag name="IGUANATEXSIZE" val="18"/>
+  <p:tag name="IGUANATEXCURSOR" val="86"/>
+  <p:tag name="TRANSPARENCY" val="True"/>
+  <p:tag name="FILENAME" val=""/>
+  <p:tag name="INPUTTYPE" val="0"/>
+  <p:tag name="LATEXENGINEID" val="1"/>
+  <p:tag name="TEMPFOLDER" val="C:\Users\beto\Documents\iguanaTemp\"/>
+</p:tagLst>
+</file>
+
+<file path=ppt/tags/tag13.xml><?xml version="1.0" encoding="utf-8"?>
+<p:tagLst xmlns:a="http://schemas.openxmlformats.org/drawingml/2006/main" xmlns:r="http://schemas.openxmlformats.org/officeDocument/2006/relationships" xmlns:p="http://schemas.openxmlformats.org/presentationml/2006/main">
+  <p:tag name="ORIGINALHEIGHT" val="83.00425"/>
+  <p:tag name="ORIGINALWIDTH" val="169.0087"/>
+  <p:tag name="OUTPUTDPI" val="1200"/>
+  <p:tag name="LATEXADDIN" val="\documentclass{article}&#10;\usepackage{amsmath}&#10;\pagestyle{empty}&#10;\begin{document}&#10;&#10;$(1,2)$&#10;&#10;&#10;\end{document}"/>
+  <p:tag name="IGUANATEXSIZE" val="18"/>
+  <p:tag name="IGUANATEXCURSOR" val="84"/>
+  <p:tag name="TRANSPARENCY" val="True"/>
+  <p:tag name="FILENAME" val=""/>
+  <p:tag name="INPUTTYPE" val="0"/>
+  <p:tag name="LATEXENGINEID" val="1"/>
+  <p:tag name="TEMPFOLDER" val="C:\Users\beto\Documents\iguanaTemp\"/>
+</p:tagLst>
+</file>
+
+<file path=ppt/tags/tag14.xml><?xml version="1.0" encoding="utf-8"?>
+<p:tagLst xmlns:a="http://schemas.openxmlformats.org/drawingml/2006/main" xmlns:r="http://schemas.openxmlformats.org/officeDocument/2006/relationships" xmlns:p="http://schemas.openxmlformats.org/presentationml/2006/main">
+  <p:tag name="ORIGINALHEIGHT" val="83.00425"/>
+  <p:tag name="ORIGINALWIDTH" val="169.0087"/>
+  <p:tag name="OUTPUTDPI" val="1200"/>
+  <p:tag name="LATEXADDIN" val="\documentclass{article}&#10;\usepackage{amsmath}&#10;\pagestyle{empty}&#10;\begin{document}&#10;&#10;$(2,2)$&#10;&#10;&#10;\end{document}"/>
+  <p:tag name="IGUANATEXSIZE" val="18"/>
+  <p:tag name="IGUANATEXCURSOR" val="84"/>
+  <p:tag name="TRANSPARENCY" val="True"/>
+  <p:tag name="FILENAME" val=""/>
+  <p:tag name="INPUTTYPE" val="0"/>
+  <p:tag name="LATEXENGINEID" val="1"/>
+  <p:tag name="TEMPFOLDER" val="C:\Users\beto\Documents\iguanaTemp\"/>
+</p:tagLst>
+</file>
+
+<file path=ppt/tags/tag15.xml><?xml version="1.0" encoding="utf-8"?>
+<p:tagLst xmlns:a="http://schemas.openxmlformats.org/drawingml/2006/main" xmlns:r="http://schemas.openxmlformats.org/officeDocument/2006/relationships" xmlns:p="http://schemas.openxmlformats.org/presentationml/2006/main">
+  <p:tag name="ORIGINALHEIGHT" val="83.00425"/>
+  <p:tag name="ORIGINALWIDTH" val="169.0087"/>
+  <p:tag name="OUTPUTDPI" val="1200"/>
+  <p:tag name="LATEXADDIN" val="\documentclass{article}&#10;\usepackage{amsmath}&#10;\pagestyle{empty}&#10;\begin{document}&#10;&#10;$(1,1)$&#10;&#10;&#10;\end{document}"/>
+  <p:tag name="IGUANATEXSIZE" val="18"/>
+  <p:tag name="IGUANATEXCURSOR" val="86"/>
+  <p:tag name="TRANSPARENCY" val="True"/>
+  <p:tag name="FILENAME" val=""/>
+  <p:tag name="INPUTTYPE" val="0"/>
+  <p:tag name="LATEXENGINEID" val="1"/>
+  <p:tag name="TEMPFOLDER" val="C:\Users\beto\Documents\iguanaTemp\"/>
+</p:tagLst>
+</file>
+
+<file path=ppt/tags/tag16.xml><?xml version="1.0" encoding="utf-8"?>
+<p:tagLst xmlns:a="http://schemas.openxmlformats.org/drawingml/2006/main" xmlns:r="http://schemas.openxmlformats.org/officeDocument/2006/relationships" xmlns:p="http://schemas.openxmlformats.org/presentationml/2006/main">
+  <p:tag name="ORIGINALHEIGHT" val="83.00425"/>
+  <p:tag name="ORIGINALWIDTH" val="169.0087"/>
+  <p:tag name="OUTPUTDPI" val="1200"/>
+  <p:tag name="LATEXADDIN" val="\documentclass{article}&#10;\usepackage{amsmath}&#10;\pagestyle{empty}&#10;\begin{document}&#10;&#10;$(2,1)$&#10;&#10;&#10;\end{document}"/>
+  <p:tag name="IGUANATEXSIZE" val="18"/>
+  <p:tag name="IGUANATEXCURSOR" val="86"/>
+  <p:tag name="TRANSPARENCY" val="True"/>
+  <p:tag name="FILENAME" val=""/>
+  <p:tag name="INPUTTYPE" val="0"/>
+  <p:tag name="LATEXENGINEID" val="1"/>
+  <p:tag name="TEMPFOLDER" val="C:\Users\beto\Documents\iguanaTemp\"/>
+</p:tagLst>
+</file>
+
+<file path=ppt/tags/tag17.xml><?xml version="1.0" encoding="utf-8"?>
+<p:tagLst xmlns:a="http://schemas.openxmlformats.org/drawingml/2006/main" xmlns:r="http://schemas.openxmlformats.org/officeDocument/2006/relationships" xmlns:p="http://schemas.openxmlformats.org/presentationml/2006/main">
+  <p:tag name="ORIGINALHEIGHT" val="83.00425"/>
+  <p:tag name="ORIGINALWIDTH" val="169.0087"/>
+  <p:tag name="OUTPUTDPI" val="1200"/>
+  <p:tag name="LATEXADDIN" val="\documentclass{article}&#10;\usepackage{amsmath}&#10;\pagestyle{empty}&#10;\begin{document}&#10;&#10;$(1,0)$&#10;&#10;&#10;\end{document}"/>
+  <p:tag name="IGUANATEXSIZE" val="18"/>
+  <p:tag name="IGUANATEXCURSOR" val="84"/>
+  <p:tag name="TRANSPARENCY" val="True"/>
+  <p:tag name="FILENAME" val=""/>
+  <p:tag name="INPUTTYPE" val="0"/>
+  <p:tag name="LATEXENGINEID" val="1"/>
+  <p:tag name="TEMPFOLDER" val="C:\Users\beto\Documents\iguanaTemp\"/>
+</p:tagLst>
+</file>
+
+<file path=ppt/tags/tag18.xml><?xml version="1.0" encoding="utf-8"?>
+<p:tagLst xmlns:a="http://schemas.openxmlformats.org/drawingml/2006/main" xmlns:r="http://schemas.openxmlformats.org/officeDocument/2006/relationships" xmlns:p="http://schemas.openxmlformats.org/presentationml/2006/main">
+  <p:tag name="ORIGINALHEIGHT" val="83.00425"/>
+  <p:tag name="ORIGINALWIDTH" val="169.0087"/>
+  <p:tag name="OUTPUTDPI" val="1200"/>
+  <p:tag name="LATEXADDIN" val="\documentclass{article}&#10;\usepackage{amsmath}&#10;\pagestyle{empty}&#10;\begin{document}&#10;&#10;$(2,0)$&#10;&#10;&#10;\end{document}"/>
+  <p:tag name="IGUANATEXSIZE" val="18"/>
+  <p:tag name="IGUANATEXCURSOR" val="86"/>
+  <p:tag name="TRANSPARENCY" val="True"/>
+  <p:tag name="FILENAME" val=""/>
+  <p:tag name="INPUTTYPE" val="0"/>
+  <p:tag name="LATEXENGINEID" val="1"/>
+  <p:tag name="TEMPFOLDER" val="C:\Users\beto\Documents\iguanaTemp\"/>
+</p:tagLst>
+</file>
+
+<file path=ppt/tags/tag19.xml><?xml version="1.0" encoding="utf-8"?>
 <p:tagLst xmlns:a="http://schemas.openxmlformats.org/drawingml/2006/main" xmlns:r="http://schemas.openxmlformats.org/officeDocument/2006/relationships" xmlns:p="http://schemas.openxmlformats.org/presentationml/2006/main">
   <p:tag name="ORIGINALHEIGHT" val="71.5037"/>
   <p:tag name="ORIGINALWIDTH" val="104.5054"/>
@@ -3962,7 +4755,23 @@
 </p:tagLst>
 </file>
 
-<file path=ppt/tags/tag11.xml><?xml version="1.0" encoding="utf-8"?>
+<file path=ppt/tags/tag2.xml><?xml version="1.0" encoding="utf-8"?>
+<p:tagLst xmlns:a="http://schemas.openxmlformats.org/drawingml/2006/main" xmlns:r="http://schemas.openxmlformats.org/officeDocument/2006/relationships" xmlns:p="http://schemas.openxmlformats.org/presentationml/2006/main">
+  <p:tag name="ORIGINALHEIGHT" val="52.00268"/>
+  <p:tag name="ORIGINALWIDTH" val="26.50134"/>
+  <p:tag name="OUTPUTDPI" val="1200"/>
+  <p:tag name="LATEXADDIN" val="\documentclass{article}&#10;\usepackage{amsmath}&#10;\pagestyle{empty}&#10;\begin{document}&#10;&#10;t&#10;&#10;&#10;\end{document}"/>
+  <p:tag name="IGUANATEXSIZE" val="20"/>
+  <p:tag name="IGUANATEXCURSOR" val="82"/>
+  <p:tag name="TRANSPARENCY" val="True"/>
+  <p:tag name="FILENAME" val=""/>
+  <p:tag name="INPUTTYPE" val="0"/>
+  <p:tag name="LATEXENGINEID" val="1"/>
+  <p:tag name="TEMPFOLDER" val="C:\Users\beto\Documents\iguanaTemp\"/>
+</p:tagLst>
+</file>
+
+<file path=ppt/tags/tag20.xml><?xml version="1.0" encoding="utf-8"?>
 <p:tagLst xmlns:a="http://schemas.openxmlformats.org/drawingml/2006/main" xmlns:r="http://schemas.openxmlformats.org/officeDocument/2006/relationships" xmlns:p="http://schemas.openxmlformats.org/presentationml/2006/main">
   <p:tag name="ORIGINALHEIGHT" val="72.5037"/>
   <p:tag name="ORIGINALWIDTH" val="107.0055"/>
@@ -3978,7 +4787,7 @@
 </p:tagLst>
 </file>
 
-<file path=ppt/tags/tag12.xml><?xml version="1.0" encoding="utf-8"?>
+<file path=ppt/tags/tag21.xml><?xml version="1.0" encoding="utf-8"?>
 <p:tagLst xmlns:a="http://schemas.openxmlformats.org/drawingml/2006/main" xmlns:r="http://schemas.openxmlformats.org/officeDocument/2006/relationships" xmlns:p="http://schemas.openxmlformats.org/presentationml/2006/main">
   <p:tag name="ORIGINALHEIGHT" val="59.50307"/>
   <p:tag name="ORIGINALWIDTH" val="34.50181"/>
@@ -3994,30 +4803,14 @@
 </p:tagLst>
 </file>
 
-<file path=ppt/tags/tag2.xml><?xml version="1.0" encoding="utf-8"?>
-<p:tagLst xmlns:a="http://schemas.openxmlformats.org/drawingml/2006/main" xmlns:r="http://schemas.openxmlformats.org/officeDocument/2006/relationships" xmlns:p="http://schemas.openxmlformats.org/presentationml/2006/main">
-  <p:tag name="ORIGINALHEIGHT" val="83.00425"/>
-  <p:tag name="ORIGINALWIDTH" val="169.0087"/>
-  <p:tag name="OUTPUTDPI" val="1200"/>
-  <p:tag name="LATEXADDIN" val="\documentclass{article}&#10;\usepackage{amsmath}&#10;\pagestyle{empty}&#10;\begin{document}&#10;&#10;$(0,1)$&#10;&#10;&#10;\end{document}"/>
-  <p:tag name="IGUANATEXSIZE" val="18"/>
-  <p:tag name="IGUANATEXCURSOR" val="86"/>
-  <p:tag name="TRANSPARENCY" val="True"/>
-  <p:tag name="FILENAME" val=""/>
-  <p:tag name="INPUTTYPE" val="0"/>
-  <p:tag name="LATEXENGINEID" val="1"/>
-  <p:tag name="TEMPFOLDER" val="C:\Users\beto\Documents\iguanaTemp\"/>
-</p:tagLst>
-</file>
-
 <file path=ppt/tags/tag3.xml><?xml version="1.0" encoding="utf-8"?>
 <p:tagLst xmlns:a="http://schemas.openxmlformats.org/drawingml/2006/main" xmlns:r="http://schemas.openxmlformats.org/officeDocument/2006/relationships" xmlns:p="http://schemas.openxmlformats.org/presentationml/2006/main">
-  <p:tag name="ORIGINALHEIGHT" val="83.00425"/>
-  <p:tag name="ORIGINALWIDTH" val="169.0087"/>
+  <p:tag name="ORIGINALHEIGHT" val="58.50299"/>
+  <p:tag name="ORIGINALWIDTH" val="84.00433"/>
   <p:tag name="OUTPUTDPI" val="1200"/>
-  <p:tag name="LATEXADDIN" val="\documentclass{article}&#10;\usepackage{amsmath}&#10;\pagestyle{empty}&#10;\begin{document}&#10;&#10;$(0,2)$&#10;&#10;&#10;\end{document}"/>
-  <p:tag name="IGUANATEXSIZE" val="18"/>
-  <p:tag name="IGUANATEXCURSOR" val="86"/>
+  <p:tag name="LATEXADDIN" val="\documentclass{article}&#10;\usepackage{amsmath}&#10;\pagestyle{empty}&#10;\begin{document}&#10;&#10;Rt&#10;&#10;&#10;\end{document}"/>
+  <p:tag name="IGUANATEXSIZE" val="20"/>
+  <p:tag name="IGUANATEXCURSOR" val="83"/>
   <p:tag name="TRANSPARENCY" val="True"/>
   <p:tag name="FILENAME" val=""/>
   <p:tag name="INPUTTYPE" val="0"/>
@@ -4028,12 +4821,12 @@
 
 <file path=ppt/tags/tag4.xml><?xml version="1.0" encoding="utf-8"?>
 <p:tagLst xmlns:a="http://schemas.openxmlformats.org/drawingml/2006/main" xmlns:r="http://schemas.openxmlformats.org/officeDocument/2006/relationships" xmlns:p="http://schemas.openxmlformats.org/presentationml/2006/main">
-  <p:tag name="ORIGINALHEIGHT" val="83.00425"/>
-  <p:tag name="ORIGINALWIDTH" val="169.0087"/>
+  <p:tag name="ORIGINALHEIGHT" val="58.50299"/>
+  <p:tag name="ORIGINALWIDTH" val="126.0065"/>
   <p:tag name="OUTPUTDPI" val="1200"/>
-  <p:tag name="LATEXADDIN" val="\documentclass{article}&#10;\usepackage{amsmath}&#10;\pagestyle{empty}&#10;\begin{document}&#10;&#10;$(1,2)$&#10;&#10;&#10;\end{document}"/>
-  <p:tag name="IGUANATEXSIZE" val="18"/>
-  <p:tag name="IGUANATEXCURSOR" val="84"/>
+  <p:tag name="LATEXADDIN" val="\documentclass{article}&#10;\usepackage{amsmath}&#10;\pagestyle{empty}&#10;\begin{document}&#10;&#10;Rm&#10;&#10;&#10;\end{document}"/>
+  <p:tag name="IGUANATEXSIZE" val="20"/>
+  <p:tag name="IGUANATEXCURSOR" val="83"/>
   <p:tag name="TRANSPARENCY" val="True"/>
   <p:tag name="FILENAME" val=""/>
   <p:tag name="INPUTTYPE" val="0"/>
@@ -4044,12 +4837,12 @@
 
 <file path=ppt/tags/tag5.xml><?xml version="1.0" encoding="utf-8"?>
 <p:tagLst xmlns:a="http://schemas.openxmlformats.org/drawingml/2006/main" xmlns:r="http://schemas.openxmlformats.org/officeDocument/2006/relationships" xmlns:p="http://schemas.openxmlformats.org/presentationml/2006/main">
-  <p:tag name="ORIGINALHEIGHT" val="83.00425"/>
-  <p:tag name="ORIGINALWIDTH" val="169.0087"/>
+  <p:tag name="ORIGINALHEIGHT" val="59.50307"/>
+  <p:tag name="ORIGINALWIDTH" val="102.0053"/>
   <p:tag name="OUTPUTDPI" val="1200"/>
-  <p:tag name="LATEXADDIN" val="\documentclass{article}&#10;\usepackage{amsmath}&#10;\pagestyle{empty}&#10;\begin{document}&#10;&#10;$(2,2)$&#10;&#10;&#10;\end{document}"/>
-  <p:tag name="IGUANATEXSIZE" val="18"/>
-  <p:tag name="IGUANATEXCURSOR" val="84"/>
+  <p:tag name="LATEXADDIN" val="\documentclass{article}&#10;\usepackage{amsmath}&#10;\pagestyle{empty}&#10;\begin{document}&#10;&#10;Rb&#10;&#10;&#10;\end{document}"/>
+  <p:tag name="IGUANATEXSIZE" val="20"/>
+  <p:tag name="IGUANATEXCURSOR" val="83"/>
   <p:tag name="TRANSPARENCY" val="True"/>
   <p:tag name="FILENAME" val=""/>
   <p:tag name="INPUTTYPE" val="0"/>
@@ -4060,12 +4853,12 @@
 
 <file path=ppt/tags/tag6.xml><?xml version="1.0" encoding="utf-8"?>
 <p:tagLst xmlns:a="http://schemas.openxmlformats.org/drawingml/2006/main" xmlns:r="http://schemas.openxmlformats.org/officeDocument/2006/relationships" xmlns:p="http://schemas.openxmlformats.org/presentationml/2006/main">
-  <p:tag name="ORIGINALHEIGHT" val="83.00425"/>
-  <p:tag name="ORIGINALWIDTH" val="169.0087"/>
+  <p:tag name="ORIGINALHEIGHT" val="36.50189"/>
+  <p:tag name="ORIGINALWIDTH" val="65.0033"/>
   <p:tag name="OUTPUTDPI" val="1200"/>
-  <p:tag name="LATEXADDIN" val="\documentclass{article}&#10;\usepackage{amsmath}&#10;\pagestyle{empty}&#10;\begin{document}&#10;&#10;$(1,1)$&#10;&#10;&#10;\end{document}"/>
-  <p:tag name="IGUANATEXSIZE" val="18"/>
-  <p:tag name="IGUANATEXCURSOR" val="86"/>
+  <p:tag name="LATEXADDIN" val="\documentclass{article}&#10;\usepackage{amsmath}&#10;\pagestyle{empty}&#10;\begin{document}&#10;&#10;m&#10;&#10;&#10;\end{document}"/>
+  <p:tag name="IGUANATEXSIZE" val="20"/>
+  <p:tag name="IGUANATEXCURSOR" val="82"/>
   <p:tag name="TRANSPARENCY" val="True"/>
   <p:tag name="FILENAME" val=""/>
   <p:tag name="INPUTTYPE" val="0"/>
@@ -4076,12 +4869,12 @@
 
 <file path=ppt/tags/tag7.xml><?xml version="1.0" encoding="utf-8"?>
 <p:tagLst xmlns:a="http://schemas.openxmlformats.org/drawingml/2006/main" xmlns:r="http://schemas.openxmlformats.org/officeDocument/2006/relationships" xmlns:p="http://schemas.openxmlformats.org/presentationml/2006/main">
-  <p:tag name="ORIGINALHEIGHT" val="83.00425"/>
-  <p:tag name="ORIGINALWIDTH" val="169.0087"/>
+  <p:tag name="ORIGINALHEIGHT" val="58.50299"/>
+  <p:tag name="ORIGINALWIDTH" val="42.00212"/>
   <p:tag name="OUTPUTDPI" val="1200"/>
-  <p:tag name="LATEXADDIN" val="\documentclass{article}&#10;\usepackage{amsmath}&#10;\pagestyle{empty}&#10;\begin{document}&#10;&#10;$(2,1)$&#10;&#10;&#10;\end{document}"/>
-  <p:tag name="IGUANATEXSIZE" val="18"/>
-  <p:tag name="IGUANATEXCURSOR" val="86"/>
+  <p:tag name="LATEXADDIN" val="\documentclass{article}&#10;\usepackage{amsmath}&#10;\pagestyle{empty}&#10;\begin{document}&#10;&#10;b&#10;&#10;&#10;\end{document}"/>
+  <p:tag name="IGUANATEXSIZE" val="20"/>
+  <p:tag name="IGUANATEXCURSOR" val="82"/>
   <p:tag name="TRANSPARENCY" val="True"/>
   <p:tag name="FILENAME" val=""/>
   <p:tag name="INPUTTYPE" val="0"/>
@@ -4092,12 +4885,12 @@
 
 <file path=ppt/tags/tag8.xml><?xml version="1.0" encoding="utf-8"?>
 <p:tagLst xmlns:a="http://schemas.openxmlformats.org/drawingml/2006/main" xmlns:r="http://schemas.openxmlformats.org/officeDocument/2006/relationships" xmlns:p="http://schemas.openxmlformats.org/presentationml/2006/main">
-  <p:tag name="ORIGINALHEIGHT" val="83.00425"/>
-  <p:tag name="ORIGINALWIDTH" val="169.0087"/>
+  <p:tag name="ORIGINALHEIGHT" val="56.50291"/>
+  <p:tag name="ORIGINALWIDTH" val="117.006"/>
   <p:tag name="OUTPUTDPI" val="1200"/>
-  <p:tag name="LATEXADDIN" val="\documentclass{article}&#10;\usepackage{amsmath}&#10;\pagestyle{empty}&#10;\begin{document}&#10;&#10;$(1,0)$&#10;&#10;&#10;\end{document}"/>
-  <p:tag name="IGUANATEXSIZE" val="18"/>
-  <p:tag name="IGUANATEXCURSOR" val="84"/>
+  <p:tag name="LATEXADDIN" val="\documentclass{article}&#10;\usepackage{amsmath}&#10;\pagestyle{empty}&#10;\begin{document}&#10;&#10;Lm&#10;&#10;&#10;\end{document}"/>
+  <p:tag name="IGUANATEXSIZE" val="20"/>
+  <p:tag name="IGUANATEXCURSOR" val="83"/>
   <p:tag name="TRANSPARENCY" val="True"/>
   <p:tag name="FILENAME" val=""/>
   <p:tag name="INPUTTYPE" val="0"/>
@@ -4108,12 +4901,12 @@
 
 <file path=ppt/tags/tag9.xml><?xml version="1.0" encoding="utf-8"?>
 <p:tagLst xmlns:a="http://schemas.openxmlformats.org/drawingml/2006/main" xmlns:r="http://schemas.openxmlformats.org/officeDocument/2006/relationships" xmlns:p="http://schemas.openxmlformats.org/presentationml/2006/main">
-  <p:tag name="ORIGINALHEIGHT" val="83.00425"/>
-  <p:tag name="ORIGINALWIDTH" val="169.0087"/>
+  <p:tag name="ORIGINALHEIGHT" val="58.50299"/>
+  <p:tag name="ORIGINALWIDTH" val="92.50472"/>
   <p:tag name="OUTPUTDPI" val="1200"/>
-  <p:tag name="LATEXADDIN" val="\documentclass{article}&#10;\usepackage{amsmath}&#10;\pagestyle{empty}&#10;\begin{document}&#10;&#10;$(2,0)$&#10;&#10;&#10;\end{document}"/>
-  <p:tag name="IGUANATEXSIZE" val="18"/>
-  <p:tag name="IGUANATEXCURSOR" val="86"/>
+  <p:tag name="LATEXADDIN" val="\documentclass{article}&#10;\usepackage{amsmath}&#10;\pagestyle{empty}&#10;\begin{document}&#10;&#10;Lb&#10;&#10;&#10;\end{document}"/>
+  <p:tag name="IGUANATEXSIZE" val="20"/>
+  <p:tag name="IGUANATEXCURSOR" val="83"/>
   <p:tag name="TRANSPARENCY" val="True"/>
   <p:tag name="FILENAME" val=""/>
   <p:tag name="INPUTTYPE" val="0"/>

</xml_diff>